<commit_message>
Added 2 more slides
</commit_message>
<xml_diff>
--- a/Epileptic Seizure Recognition.pptx
+++ b/Epileptic Seizure Recognition.pptx
@@ -5,10 +5,10 @@
     <p:sldMasterId id="2147483648" r:id="rId4"/>
   </p:sldMasterIdLst>
   <p:notesMasterIdLst>
-    <p:notesMasterId r:id="rId12"/>
+    <p:notesMasterId r:id="rId14"/>
   </p:notesMasterIdLst>
   <p:handoutMasterIdLst>
-    <p:handoutMasterId r:id="rId13"/>
+    <p:handoutMasterId r:id="rId15"/>
   </p:handoutMasterIdLst>
   <p:sldIdLst>
     <p:sldId id="256" r:id="rId5"/>
@@ -16,8 +16,10 @@
     <p:sldId id="258" r:id="rId7"/>
     <p:sldId id="286" r:id="rId8"/>
     <p:sldId id="287" r:id="rId9"/>
-    <p:sldId id="288" r:id="rId10"/>
-    <p:sldId id="289" r:id="rId11"/>
+    <p:sldId id="290" r:id="rId10"/>
+    <p:sldId id="288" r:id="rId11"/>
+    <p:sldId id="291" r:id="rId12"/>
+    <p:sldId id="289" r:id="rId13"/>
   </p:sldIdLst>
   <p:sldSz cx="12192000" cy="6858000"/>
   <p:notesSz cx="6858000" cy="9144000"/>
@@ -125,14 +127,6 @@
     </p:ext>
   </p:extLst>
 </p:presentation>
-</file>
-
-<file path=ppt/revisionInfo.xml><?xml version="1.0" encoding="utf-8"?>
-<p1510:revInfo xmlns:a="http://schemas.openxmlformats.org/drawingml/2006/main" xmlns:r="http://schemas.openxmlformats.org/officeDocument/2006/relationships" xmlns:p1510="http://schemas.microsoft.com/office/powerpoint/2015/10/main">
-  <p1510:revLst>
-    <p1510:client id="{D0E29F2B-EB8E-4FD2-93BF-E74D2DA48DFF}" v="1" dt="2024-11-07T16:14:04.288"/>
-  </p1510:revLst>
-</p1510:revInfo>
 </file>
 
 <file path=ppt/changesInfos/changesInfo1.xml><?xml version="1.0" encoding="utf-8"?>
@@ -377,6 +371,140 @@
       </pc:sldChg>
     </pc:docChg>
   </pc:docChgLst>
+  <pc:docChgLst>
+    <pc:chgData name="Sam Gabor" userId="ea49d492-943e-4fe2-a4f1-c1b06c4a300a" providerId="ADAL" clId="{12B65D99-37CE-43DD-8D61-9BEC75BED579}"/>
+    <pc:docChg chg="custSel addSld modSld">
+      <pc:chgData name="Sam Gabor" userId="ea49d492-943e-4fe2-a4f1-c1b06c4a300a" providerId="ADAL" clId="{12B65D99-37CE-43DD-8D61-9BEC75BED579}" dt="2024-11-11T16:39:00.611" v="369" actId="14100"/>
+      <pc:docMkLst>
+        <pc:docMk/>
+      </pc:docMkLst>
+      <pc:sldChg chg="addSp delSp modSp mod">
+        <pc:chgData name="Sam Gabor" userId="ea49d492-943e-4fe2-a4f1-c1b06c4a300a" providerId="ADAL" clId="{12B65D99-37CE-43DD-8D61-9BEC75BED579}" dt="2024-11-11T16:22:27.032" v="126" actId="1076"/>
+        <pc:sldMkLst>
+          <pc:docMk/>
+          <pc:sldMk cId="480070182" sldId="287"/>
+        </pc:sldMkLst>
+        <pc:spChg chg="add del mod">
+          <ac:chgData name="Sam Gabor" userId="ea49d492-943e-4fe2-a4f1-c1b06c4a300a" providerId="ADAL" clId="{12B65D99-37CE-43DD-8D61-9BEC75BED579}" dt="2024-11-11T16:13:19.587" v="22" actId="478"/>
+          <ac:spMkLst>
+            <pc:docMk/>
+            <pc:sldMk cId="480070182" sldId="287"/>
+            <ac:spMk id="5" creationId="{0AFF00EF-2B11-7411-8A4A-D3F1C2C066B4}"/>
+          </ac:spMkLst>
+        </pc:spChg>
+        <pc:spChg chg="mod">
+          <ac:chgData name="Sam Gabor" userId="ea49d492-943e-4fe2-a4f1-c1b06c4a300a" providerId="ADAL" clId="{12B65D99-37CE-43DD-8D61-9BEC75BED579}" dt="2024-11-11T16:12:50.791" v="20" actId="20577"/>
+          <ac:spMkLst>
+            <pc:docMk/>
+            <pc:sldMk cId="480070182" sldId="287"/>
+            <ac:spMk id="7" creationId="{CC3367EC-F890-BAEC-694C-48D8206146D0}"/>
+          </ac:spMkLst>
+        </pc:spChg>
+        <pc:picChg chg="del">
+          <ac:chgData name="Sam Gabor" userId="ea49d492-943e-4fe2-a4f1-c1b06c4a300a" providerId="ADAL" clId="{12B65D99-37CE-43DD-8D61-9BEC75BED579}" dt="2024-11-11T16:13:12.168" v="21" actId="478"/>
+          <ac:picMkLst>
+            <pc:docMk/>
+            <pc:sldMk cId="480070182" sldId="287"/>
+            <ac:picMk id="6" creationId="{5E9FAEF3-28DF-D62D-3E81-21E0036E8930}"/>
+          </ac:picMkLst>
+        </pc:picChg>
+        <pc:picChg chg="add del mod">
+          <ac:chgData name="Sam Gabor" userId="ea49d492-943e-4fe2-a4f1-c1b06c4a300a" providerId="ADAL" clId="{12B65D99-37CE-43DD-8D61-9BEC75BED579}" dt="2024-11-11T16:19:02.427" v="29" actId="478"/>
+          <ac:picMkLst>
+            <pc:docMk/>
+            <pc:sldMk cId="480070182" sldId="287"/>
+            <ac:picMk id="9" creationId="{2CE00C2A-C6FD-83F2-ACD8-908DDA2F0FAD}"/>
+          </ac:picMkLst>
+        </pc:picChg>
+        <pc:picChg chg="add del mod">
+          <ac:chgData name="Sam Gabor" userId="ea49d492-943e-4fe2-a4f1-c1b06c4a300a" providerId="ADAL" clId="{12B65D99-37CE-43DD-8D61-9BEC75BED579}" dt="2024-11-11T16:21:23.783" v="120" actId="478"/>
+          <ac:picMkLst>
+            <pc:docMk/>
+            <pc:sldMk cId="480070182" sldId="287"/>
+            <ac:picMk id="11" creationId="{966E66E2-BD21-010A-7C03-149BED748C3D}"/>
+          </ac:picMkLst>
+        </pc:picChg>
+        <pc:picChg chg="add mod">
+          <ac:chgData name="Sam Gabor" userId="ea49d492-943e-4fe2-a4f1-c1b06c4a300a" providerId="ADAL" clId="{12B65D99-37CE-43DD-8D61-9BEC75BED579}" dt="2024-11-11T16:22:27.032" v="126" actId="1076"/>
+          <ac:picMkLst>
+            <pc:docMk/>
+            <pc:sldMk cId="480070182" sldId="287"/>
+            <ac:picMk id="13" creationId="{B8905112-6599-57D7-271A-F739E987BF1F}"/>
+          </ac:picMkLst>
+        </pc:picChg>
+      </pc:sldChg>
+      <pc:sldChg chg="addSp delSp modSp add mod">
+        <pc:chgData name="Sam Gabor" userId="ea49d492-943e-4fe2-a4f1-c1b06c4a300a" providerId="ADAL" clId="{12B65D99-37CE-43DD-8D61-9BEC75BED579}" dt="2024-11-11T16:24:03.798" v="130" actId="1076"/>
+        <pc:sldMkLst>
+          <pc:docMk/>
+          <pc:sldMk cId="1120547527" sldId="290"/>
+        </pc:sldMkLst>
+        <pc:spChg chg="mod">
+          <ac:chgData name="Sam Gabor" userId="ea49d492-943e-4fe2-a4f1-c1b06c4a300a" providerId="ADAL" clId="{12B65D99-37CE-43DD-8D61-9BEC75BED579}" dt="2024-11-11T16:20:17.213" v="116" actId="20577"/>
+          <ac:spMkLst>
+            <pc:docMk/>
+            <pc:sldMk cId="1120547527" sldId="290"/>
+            <ac:spMk id="7" creationId="{43D23822-918D-EB1D-A24E-8C6202BE5E71}"/>
+          </ac:spMkLst>
+        </pc:spChg>
+        <pc:picChg chg="add del mod">
+          <ac:chgData name="Sam Gabor" userId="ea49d492-943e-4fe2-a4f1-c1b06c4a300a" providerId="ADAL" clId="{12B65D99-37CE-43DD-8D61-9BEC75BED579}" dt="2024-11-11T16:22:53.254" v="127" actId="478"/>
+          <ac:picMkLst>
+            <pc:docMk/>
+            <pc:sldMk cId="1120547527" sldId="290"/>
+            <ac:picMk id="5" creationId="{A7190CF2-DAA7-F53F-50D9-317C8B6EE31C}"/>
+          </ac:picMkLst>
+        </pc:picChg>
+        <pc:picChg chg="add mod">
+          <ac:chgData name="Sam Gabor" userId="ea49d492-943e-4fe2-a4f1-c1b06c4a300a" providerId="ADAL" clId="{12B65D99-37CE-43DD-8D61-9BEC75BED579}" dt="2024-11-11T16:24:03.798" v="130" actId="1076"/>
+          <ac:picMkLst>
+            <pc:docMk/>
+            <pc:sldMk cId="1120547527" sldId="290"/>
+            <ac:picMk id="8" creationId="{B65D510C-CF43-C47F-5965-C7ADBC932251}"/>
+          </ac:picMkLst>
+        </pc:picChg>
+        <pc:picChg chg="del">
+          <ac:chgData name="Sam Gabor" userId="ea49d492-943e-4fe2-a4f1-c1b06c4a300a" providerId="ADAL" clId="{12B65D99-37CE-43DD-8D61-9BEC75BED579}" dt="2024-11-11T16:19:46.797" v="36" actId="478"/>
+          <ac:picMkLst>
+            <pc:docMk/>
+            <pc:sldMk cId="1120547527" sldId="290"/>
+            <ac:picMk id="11" creationId="{06A4BB6D-0E5F-EF0A-63E1-A24AA9F8ABDD}"/>
+          </ac:picMkLst>
+        </pc:picChg>
+      </pc:sldChg>
+      <pc:sldChg chg="addSp delSp modSp add mod">
+        <pc:chgData name="Sam Gabor" userId="ea49d492-943e-4fe2-a4f1-c1b06c4a300a" providerId="ADAL" clId="{12B65D99-37CE-43DD-8D61-9BEC75BED579}" dt="2024-11-11T16:39:00.611" v="369" actId="14100"/>
+        <pc:sldMkLst>
+          <pc:docMk/>
+          <pc:sldMk cId="3973068607" sldId="291"/>
+        </pc:sldMkLst>
+        <pc:spChg chg="mod">
+          <ac:chgData name="Sam Gabor" userId="ea49d492-943e-4fe2-a4f1-c1b06c4a300a" providerId="ADAL" clId="{12B65D99-37CE-43DD-8D61-9BEC75BED579}" dt="2024-11-11T16:38:51.984" v="368" actId="20577"/>
+          <ac:spMkLst>
+            <pc:docMk/>
+            <pc:sldMk cId="3973068607" sldId="291"/>
+            <ac:spMk id="7" creationId="{B092E4B6-00C4-9B53-3317-4FF2A33CFBE1}"/>
+          </ac:spMkLst>
+        </pc:spChg>
+        <pc:picChg chg="add mod">
+          <ac:chgData name="Sam Gabor" userId="ea49d492-943e-4fe2-a4f1-c1b06c4a300a" providerId="ADAL" clId="{12B65D99-37CE-43DD-8D61-9BEC75BED579}" dt="2024-11-11T16:39:00.611" v="369" actId="14100"/>
+          <ac:picMkLst>
+            <pc:docMk/>
+            <pc:sldMk cId="3973068607" sldId="291"/>
+            <ac:picMk id="5" creationId="{36066582-4D60-BDD9-1384-CA46D1900371}"/>
+          </ac:picMkLst>
+        </pc:picChg>
+        <pc:picChg chg="del">
+          <ac:chgData name="Sam Gabor" userId="ea49d492-943e-4fe2-a4f1-c1b06c4a300a" providerId="ADAL" clId="{12B65D99-37CE-43DD-8D61-9BEC75BED579}" dt="2024-11-11T16:29:38.096" v="173" actId="478"/>
+          <ac:picMkLst>
+            <pc:docMk/>
+            <pc:sldMk cId="3973068607" sldId="291"/>
+            <ac:picMk id="9" creationId="{56A502C0-7223-169A-D72D-1F9CF8D024F6}"/>
+          </ac:picMkLst>
+        </pc:picChg>
+      </pc:sldChg>
+    </pc:docChg>
+  </pc:docChgLst>
 </pc:chgInfo>
 </file>
 
@@ -474,7 +602,7 @@
           <a:p>
             <a:fld id="{B56F32FC-4BD9-442A-A8C6-51598C909FE3}" type="datetimeFigureOut">
               <a:rPr lang="en-US" smtClean="0"/>
-              <a:t>11/7/2024</a:t>
+              <a:t>11/11/2024</a:t>
             </a:fld>
             <a:endParaRPr lang="en-US" dirty="0"/>
           </a:p>
@@ -651,7 +779,7 @@
           <a:p>
             <a:fld id="{056371FA-A98D-41E8-93F4-09945841298A}" type="datetimeFigureOut">
               <a:rPr lang="en-US" smtClean="0"/>
-              <a:t>11/7/2024</a:t>
+              <a:t>11/11/2024</a:t>
             </a:fld>
             <a:endParaRPr lang="en-US" dirty="0"/>
           </a:p>
@@ -1367,7 +1495,7 @@
           <a:p>
             <a:fld id="{22289C57-55D7-40A4-A101-E74FAC7A092B}" type="slidenum">
               <a:rPr lang="en-US" smtClean="0"/>
-              <a:t>7</a:t>
+              <a:t>9</a:t>
             </a:fld>
             <a:endParaRPr lang="en-US" dirty="0"/>
           </a:p>
@@ -7325,21 +7453,84 @@
           </a:p>
         </p:txBody>
       </p:sp>
+      <p:sp>
+        <p:nvSpPr>
+          <p:cNvPr id="4" name="Slide Number Placeholder 3">
+            <a:extLst>
+              <a:ext uri="{FF2B5EF4-FFF2-40B4-BE49-F238E27FC236}">
+                <a16:creationId xmlns:a16="http://schemas.microsoft.com/office/drawing/2014/main" id="{FEA7F587-F0C8-BA7D-22EA-8EB8E0AA565E}"/>
+              </a:ext>
+            </a:extLst>
+          </p:cNvPr>
+          <p:cNvSpPr>
+            <a:spLocks noGrp="1"/>
+          </p:cNvSpPr>
+          <p:nvPr>
+            <p:ph type="sldNum" sz="quarter" idx="12"/>
+          </p:nvPr>
+        </p:nvSpPr>
+        <p:spPr/>
+        <p:txBody>
+          <a:bodyPr/>
+          <a:lstStyle/>
+          <a:p>
+            <a:fld id="{A49DFD55-3C28-40EF-9E31-A92D2E4017FF}" type="slidenum">
+              <a:rPr lang="en-US" smtClean="0"/>
+              <a:pPr/>
+              <a:t>5</a:t>
+            </a:fld>
+            <a:endParaRPr lang="en-US" dirty="0"/>
+          </a:p>
+        </p:txBody>
+      </p:sp>
+      <p:sp>
+        <p:nvSpPr>
+          <p:cNvPr id="7" name="TextBox 6">
+            <a:extLst>
+              <a:ext uri="{FF2B5EF4-FFF2-40B4-BE49-F238E27FC236}">
+                <a16:creationId xmlns:a16="http://schemas.microsoft.com/office/drawing/2014/main" id="{CC3367EC-F890-BAEC-694C-48D8206146D0}"/>
+              </a:ext>
+            </a:extLst>
+          </p:cNvPr>
+          <p:cNvSpPr txBox="1"/>
+          <p:nvPr/>
+        </p:nvSpPr>
+        <p:spPr>
+          <a:xfrm>
+            <a:off x="991312" y="2389537"/>
+            <a:ext cx="7913406" cy="738664"/>
+          </a:xfrm>
+          <a:prstGeom prst="rect">
+            <a:avLst/>
+          </a:prstGeom>
+          <a:noFill/>
+        </p:spPr>
+        <p:txBody>
+          <a:bodyPr wrap="square" rtlCol="0">
+            <a:spAutoFit/>
+          </a:bodyPr>
+          <a:lstStyle/>
+          <a:p>
+            <a:r>
+              <a:rPr lang="en-US" sz="1400" dirty="0"/>
+              <a:t>The following two plots show clear differences between the amplitudes of EEG signals for 5 samples of each category during a Non-Seizure and a Seizure recording event. These differences will be leveraged in the ML classification algorithms we employ.</a:t>
+            </a:r>
+          </a:p>
+        </p:txBody>
+      </p:sp>
       <p:pic>
         <p:nvPicPr>
-          <p:cNvPr id="6" name="Content Placeholder 5">
-            <a:extLst>
-              <a:ext uri="{FF2B5EF4-FFF2-40B4-BE49-F238E27FC236}">
-                <a16:creationId xmlns:a16="http://schemas.microsoft.com/office/drawing/2014/main" id="{5E9FAEF3-28DF-D62D-3E81-21E0036E8930}"/>
+          <p:cNvPr id="13" name="Picture 12">
+            <a:extLst>
+              <a:ext uri="{FF2B5EF4-FFF2-40B4-BE49-F238E27FC236}">
+                <a16:creationId xmlns:a16="http://schemas.microsoft.com/office/drawing/2014/main" id="{B8905112-6599-57D7-271A-F739E987BF1F}"/>
               </a:ext>
             </a:extLst>
           </p:cNvPr>
           <p:cNvPicPr>
-            <a:picLocks noGrp="1" noChangeAspect="1"/>
+            <a:picLocks noChangeAspect="1"/>
           </p:cNvPicPr>
-          <p:nvPr>
-            <p:ph sz="half" idx="2"/>
-          </p:nvPr>
+          <p:nvPr/>
         </p:nvPicPr>
         <p:blipFill>
           <a:blip r:embed="rId2"/>
@@ -7349,76 +7540,14 @@
         </p:blipFill>
         <p:spPr>
           <a:xfrm>
-            <a:off x="1322318" y="3097257"/>
-            <a:ext cx="6875314" cy="3005980"/>
-          </a:xfrm>
-        </p:spPr>
-      </p:pic>
-      <p:sp>
-        <p:nvSpPr>
-          <p:cNvPr id="4" name="Slide Number Placeholder 3">
-            <a:extLst>
-              <a:ext uri="{FF2B5EF4-FFF2-40B4-BE49-F238E27FC236}">
-                <a16:creationId xmlns:a16="http://schemas.microsoft.com/office/drawing/2014/main" id="{FEA7F587-F0C8-BA7D-22EA-8EB8E0AA565E}"/>
-              </a:ext>
-            </a:extLst>
-          </p:cNvPr>
-          <p:cNvSpPr>
-            <a:spLocks noGrp="1"/>
-          </p:cNvSpPr>
-          <p:nvPr>
-            <p:ph type="sldNum" sz="quarter" idx="12"/>
-          </p:nvPr>
-        </p:nvSpPr>
-        <p:spPr/>
-        <p:txBody>
-          <a:bodyPr/>
-          <a:lstStyle/>
-          <a:p>
-            <a:fld id="{A49DFD55-3C28-40EF-9E31-A92D2E4017FF}" type="slidenum">
-              <a:rPr lang="en-US" smtClean="0"/>
-              <a:pPr/>
-              <a:t>5</a:t>
-            </a:fld>
-            <a:endParaRPr lang="en-US" dirty="0"/>
-          </a:p>
-        </p:txBody>
-      </p:sp>
-      <p:sp>
-        <p:nvSpPr>
-          <p:cNvPr id="7" name="TextBox 6">
-            <a:extLst>
-              <a:ext uri="{FF2B5EF4-FFF2-40B4-BE49-F238E27FC236}">
-                <a16:creationId xmlns:a16="http://schemas.microsoft.com/office/drawing/2014/main" id="{CC3367EC-F890-BAEC-694C-48D8206146D0}"/>
-              </a:ext>
-            </a:extLst>
-          </p:cNvPr>
-          <p:cNvSpPr txBox="1"/>
-          <p:nvPr/>
-        </p:nvSpPr>
-        <p:spPr>
-          <a:xfrm>
-            <a:off x="991312" y="2389537"/>
-            <a:ext cx="7913406" cy="738664"/>
+            <a:off x="1749972" y="3103491"/>
+            <a:ext cx="7913406" cy="3324899"/>
           </a:xfrm>
           <a:prstGeom prst="rect">
             <a:avLst/>
           </a:prstGeom>
-          <a:noFill/>
-        </p:spPr>
-        <p:txBody>
-          <a:bodyPr wrap="square" rtlCol="0">
-            <a:spAutoFit/>
-          </a:bodyPr>
-          <a:lstStyle/>
-          <a:p>
-            <a:r>
-              <a:rPr lang="en-US" sz="1400" dirty="0"/>
-              <a:t>The plot below shows clear differences between the amplitudes of EEG signals for 5 samples of each category during a Non-Seizure (left) and a Seizure recording event (right). These differences will be leveraged in the ML classification algorithms we employ.</a:t>
-            </a:r>
-          </a:p>
-        </p:txBody>
-      </p:sp>
+        </p:spPr>
+      </p:pic>
     </p:spTree>
     <p:extLst>
       <p:ext uri="{BB962C8B-B14F-4D97-AF65-F5344CB8AC3E}">
@@ -7433,6 +7562,165 @@
 </file>
 
 <file path=ppt/slides/slide6.xml><?xml version="1.0" encoding="utf-8"?>
+<p:sld xmlns:a="http://schemas.openxmlformats.org/drawingml/2006/main" xmlns:r="http://schemas.openxmlformats.org/officeDocument/2006/relationships" xmlns:p="http://schemas.openxmlformats.org/presentationml/2006/main">
+  <p:cSld>
+    <p:spTree>
+      <p:nvGrpSpPr>
+        <p:cNvPr id="1" name="">
+          <a:extLst>
+            <a:ext uri="{FF2B5EF4-FFF2-40B4-BE49-F238E27FC236}">
+              <a16:creationId xmlns:a16="http://schemas.microsoft.com/office/drawing/2014/main" id="{D17F92DE-CAA8-E807-F19E-CD9576BBBC96}"/>
+            </a:ext>
+          </a:extLst>
+        </p:cNvPr>
+        <p:cNvGrpSpPr/>
+        <p:nvPr/>
+      </p:nvGrpSpPr>
+      <p:grpSpPr>
+        <a:xfrm>
+          <a:off x="0" y="0"/>
+          <a:ext cx="0" cy="0"/>
+          <a:chOff x="0" y="0"/>
+          <a:chExt cx="0" cy="0"/>
+        </a:xfrm>
+      </p:grpSpPr>
+      <p:sp>
+        <p:nvSpPr>
+          <p:cNvPr id="2" name="Title 1">
+            <a:extLst>
+              <a:ext uri="{FF2B5EF4-FFF2-40B4-BE49-F238E27FC236}">
+                <a16:creationId xmlns:a16="http://schemas.microsoft.com/office/drawing/2014/main" id="{00AEA0BD-5A6F-44BB-04C8-B523A20F1FFC}"/>
+              </a:ext>
+            </a:extLst>
+          </p:cNvPr>
+          <p:cNvSpPr>
+            <a:spLocks noGrp="1"/>
+          </p:cNvSpPr>
+          <p:nvPr>
+            <p:ph type="title"/>
+          </p:nvPr>
+        </p:nvSpPr>
+        <p:spPr/>
+        <p:txBody>
+          <a:bodyPr/>
+          <a:lstStyle/>
+          <a:p>
+            <a:r>
+              <a:rPr lang="en-US" dirty="0"/>
+              <a:t>Data Exploration Insights</a:t>
+            </a:r>
+          </a:p>
+        </p:txBody>
+      </p:sp>
+      <p:sp>
+        <p:nvSpPr>
+          <p:cNvPr id="4" name="Slide Number Placeholder 3">
+            <a:extLst>
+              <a:ext uri="{FF2B5EF4-FFF2-40B4-BE49-F238E27FC236}">
+                <a16:creationId xmlns:a16="http://schemas.microsoft.com/office/drawing/2014/main" id="{2D53581A-96E2-E96F-A7B4-A21A65B1A182}"/>
+              </a:ext>
+            </a:extLst>
+          </p:cNvPr>
+          <p:cNvSpPr>
+            <a:spLocks noGrp="1"/>
+          </p:cNvSpPr>
+          <p:nvPr>
+            <p:ph type="sldNum" sz="quarter" idx="12"/>
+          </p:nvPr>
+        </p:nvSpPr>
+        <p:spPr/>
+        <p:txBody>
+          <a:bodyPr/>
+          <a:lstStyle/>
+          <a:p>
+            <a:fld id="{A49DFD55-3C28-40EF-9E31-A92D2E4017FF}" type="slidenum">
+              <a:rPr lang="en-US" smtClean="0"/>
+              <a:pPr/>
+              <a:t>6</a:t>
+            </a:fld>
+            <a:endParaRPr lang="en-US" dirty="0"/>
+          </a:p>
+        </p:txBody>
+      </p:sp>
+      <p:sp>
+        <p:nvSpPr>
+          <p:cNvPr id="7" name="TextBox 6">
+            <a:extLst>
+              <a:ext uri="{FF2B5EF4-FFF2-40B4-BE49-F238E27FC236}">
+                <a16:creationId xmlns:a16="http://schemas.microsoft.com/office/drawing/2014/main" id="{43D23822-918D-EB1D-A24E-8C6202BE5E71}"/>
+              </a:ext>
+            </a:extLst>
+          </p:cNvPr>
+          <p:cNvSpPr txBox="1"/>
+          <p:nvPr/>
+        </p:nvSpPr>
+        <p:spPr>
+          <a:xfrm>
+            <a:off x="991312" y="2389537"/>
+            <a:ext cx="7913406" cy="307777"/>
+          </a:xfrm>
+          <a:prstGeom prst="rect">
+            <a:avLst/>
+          </a:prstGeom>
+          <a:noFill/>
+        </p:spPr>
+        <p:txBody>
+          <a:bodyPr wrap="square" rtlCol="0">
+            <a:spAutoFit/>
+          </a:bodyPr>
+          <a:lstStyle/>
+          <a:p>
+            <a:r>
+              <a:rPr lang="en-US" sz="1400" dirty="0"/>
+              <a:t>The plot below for Seizure event signals shows a much wider range of EEG amplitudes.</a:t>
+            </a:r>
+          </a:p>
+        </p:txBody>
+      </p:sp>
+      <p:pic>
+        <p:nvPicPr>
+          <p:cNvPr id="8" name="Picture 7">
+            <a:extLst>
+              <a:ext uri="{FF2B5EF4-FFF2-40B4-BE49-F238E27FC236}">
+                <a16:creationId xmlns:a16="http://schemas.microsoft.com/office/drawing/2014/main" id="{B65D510C-CF43-C47F-5965-C7ADBC932251}"/>
+              </a:ext>
+            </a:extLst>
+          </p:cNvPr>
+          <p:cNvPicPr>
+            <a:picLocks noChangeAspect="1"/>
+          </p:cNvPicPr>
+          <p:nvPr/>
+        </p:nvPicPr>
+        <p:blipFill>
+          <a:blip r:embed="rId2"/>
+          <a:stretch>
+            <a:fillRect/>
+          </a:stretch>
+        </p:blipFill>
+        <p:spPr>
+          <a:xfrm>
+            <a:off x="1127042" y="2687160"/>
+            <a:ext cx="7641946" cy="3902480"/>
+          </a:xfrm>
+          <a:prstGeom prst="rect">
+            <a:avLst/>
+          </a:prstGeom>
+        </p:spPr>
+      </p:pic>
+    </p:spTree>
+    <p:extLst>
+      <p:ext uri="{BB962C8B-B14F-4D97-AF65-F5344CB8AC3E}">
+        <p14:creationId xmlns:p14="http://schemas.microsoft.com/office/powerpoint/2010/main" val="1120547527"/>
+      </p:ext>
+    </p:extLst>
+  </p:cSld>
+  <p:clrMapOvr>
+    <a:masterClrMapping/>
+  </p:clrMapOvr>
+</p:sld>
+</file>
+
+<file path=ppt/slides/slide7.xml><?xml version="1.0" encoding="utf-8"?>
 <p:sld xmlns:a="http://schemas.openxmlformats.org/drawingml/2006/main" xmlns:r="http://schemas.openxmlformats.org/officeDocument/2006/relationships" xmlns:p="http://schemas.openxmlformats.org/presentationml/2006/main">
   <p:cSld>
     <p:spTree>
@@ -7507,7 +7795,7 @@
             <a:fld id="{A49DFD55-3C28-40EF-9E31-A92D2E4017FF}" type="slidenum">
               <a:rPr lang="en-US" smtClean="0"/>
               <a:pPr/>
-              <a:t>6</a:t>
+              <a:t>7</a:t>
             </a:fld>
             <a:endParaRPr lang="en-US" dirty="0"/>
           </a:p>
@@ -7591,7 +7879,166 @@
 </p:sld>
 </file>
 
-<file path=ppt/slides/slide7.xml><?xml version="1.0" encoding="utf-8"?>
+<file path=ppt/slides/slide8.xml><?xml version="1.0" encoding="utf-8"?>
+<p:sld xmlns:a="http://schemas.openxmlformats.org/drawingml/2006/main" xmlns:r="http://schemas.openxmlformats.org/officeDocument/2006/relationships" xmlns:p="http://schemas.openxmlformats.org/presentationml/2006/main">
+  <p:cSld>
+    <p:spTree>
+      <p:nvGrpSpPr>
+        <p:cNvPr id="1" name="">
+          <a:extLst>
+            <a:ext uri="{FF2B5EF4-FFF2-40B4-BE49-F238E27FC236}">
+              <a16:creationId xmlns:a16="http://schemas.microsoft.com/office/drawing/2014/main" id="{426C49B9-7B45-F670-7B8B-121BEA829350}"/>
+            </a:ext>
+          </a:extLst>
+        </p:cNvPr>
+        <p:cNvGrpSpPr/>
+        <p:nvPr/>
+      </p:nvGrpSpPr>
+      <p:grpSpPr>
+        <a:xfrm>
+          <a:off x="0" y="0"/>
+          <a:ext cx="0" cy="0"/>
+          <a:chOff x="0" y="0"/>
+          <a:chExt cx="0" cy="0"/>
+        </a:xfrm>
+      </p:grpSpPr>
+      <p:sp>
+        <p:nvSpPr>
+          <p:cNvPr id="2" name="Title 1">
+            <a:extLst>
+              <a:ext uri="{FF2B5EF4-FFF2-40B4-BE49-F238E27FC236}">
+                <a16:creationId xmlns:a16="http://schemas.microsoft.com/office/drawing/2014/main" id="{B19010EB-1161-FF1E-B39B-16E608A0A1A5}"/>
+              </a:ext>
+            </a:extLst>
+          </p:cNvPr>
+          <p:cNvSpPr>
+            <a:spLocks noGrp="1"/>
+          </p:cNvSpPr>
+          <p:nvPr>
+            <p:ph type="title"/>
+          </p:nvPr>
+        </p:nvSpPr>
+        <p:spPr/>
+        <p:txBody>
+          <a:bodyPr/>
+          <a:lstStyle/>
+          <a:p>
+            <a:r>
+              <a:rPr lang="en-US" dirty="0"/>
+              <a:t>Data Exploration Insights</a:t>
+            </a:r>
+          </a:p>
+        </p:txBody>
+      </p:sp>
+      <p:sp>
+        <p:nvSpPr>
+          <p:cNvPr id="4" name="Slide Number Placeholder 3">
+            <a:extLst>
+              <a:ext uri="{FF2B5EF4-FFF2-40B4-BE49-F238E27FC236}">
+                <a16:creationId xmlns:a16="http://schemas.microsoft.com/office/drawing/2014/main" id="{094BC1B3-E622-2679-2510-4E158C819D11}"/>
+              </a:ext>
+            </a:extLst>
+          </p:cNvPr>
+          <p:cNvSpPr>
+            <a:spLocks noGrp="1"/>
+          </p:cNvSpPr>
+          <p:nvPr>
+            <p:ph type="sldNum" sz="quarter" idx="12"/>
+          </p:nvPr>
+        </p:nvSpPr>
+        <p:spPr/>
+        <p:txBody>
+          <a:bodyPr/>
+          <a:lstStyle/>
+          <a:p>
+            <a:fld id="{A49DFD55-3C28-40EF-9E31-A92D2E4017FF}" type="slidenum">
+              <a:rPr lang="en-US" smtClean="0"/>
+              <a:pPr/>
+              <a:t>8</a:t>
+            </a:fld>
+            <a:endParaRPr lang="en-US" dirty="0"/>
+          </a:p>
+        </p:txBody>
+      </p:sp>
+      <p:sp>
+        <p:nvSpPr>
+          <p:cNvPr id="7" name="TextBox 6">
+            <a:extLst>
+              <a:ext uri="{FF2B5EF4-FFF2-40B4-BE49-F238E27FC236}">
+                <a16:creationId xmlns:a16="http://schemas.microsoft.com/office/drawing/2014/main" id="{B092E4B6-00C4-9B53-3317-4FF2A33CFBE1}"/>
+              </a:ext>
+            </a:extLst>
+          </p:cNvPr>
+          <p:cNvSpPr txBox="1"/>
+          <p:nvPr/>
+        </p:nvSpPr>
+        <p:spPr>
+          <a:xfrm>
+            <a:off x="991312" y="2389537"/>
+            <a:ext cx="7913406" cy="738664"/>
+          </a:xfrm>
+          <a:prstGeom prst="rect">
+            <a:avLst/>
+          </a:prstGeom>
+          <a:noFill/>
+        </p:spPr>
+        <p:txBody>
+          <a:bodyPr wrap="square" rtlCol="0">
+            <a:spAutoFit/>
+          </a:bodyPr>
+          <a:lstStyle/>
+          <a:p>
+            <a:r>
+              <a:rPr lang="en-US" sz="1400" dirty="0"/>
+              <a:t>The kernel density plot below also shows the probability density function of the EEG signal amplitudes for the 2 classes. Clearly, Seizure events are marked are widely distributed and have a much wider range.</a:t>
+            </a:r>
+          </a:p>
+        </p:txBody>
+      </p:sp>
+      <p:pic>
+        <p:nvPicPr>
+          <p:cNvPr id="5" name="Picture 4">
+            <a:extLst>
+              <a:ext uri="{FF2B5EF4-FFF2-40B4-BE49-F238E27FC236}">
+                <a16:creationId xmlns:a16="http://schemas.microsoft.com/office/drawing/2014/main" id="{36066582-4D60-BDD9-1384-CA46D1900371}"/>
+              </a:ext>
+            </a:extLst>
+          </p:cNvPr>
+          <p:cNvPicPr>
+            <a:picLocks noChangeAspect="1"/>
+          </p:cNvPicPr>
+          <p:nvPr/>
+        </p:nvPicPr>
+        <p:blipFill>
+          <a:blip r:embed="rId2"/>
+          <a:stretch>
+            <a:fillRect/>
+          </a:stretch>
+        </p:blipFill>
+        <p:spPr>
+          <a:xfrm>
+            <a:off x="2069041" y="3128201"/>
+            <a:ext cx="6835677" cy="3323805"/>
+          </a:xfrm>
+          <a:prstGeom prst="rect">
+            <a:avLst/>
+          </a:prstGeom>
+        </p:spPr>
+      </p:pic>
+    </p:spTree>
+    <p:extLst>
+      <p:ext uri="{BB962C8B-B14F-4D97-AF65-F5344CB8AC3E}">
+        <p14:creationId xmlns:p14="http://schemas.microsoft.com/office/powerpoint/2010/main" val="3973068607"/>
+      </p:ext>
+    </p:extLst>
+  </p:cSld>
+  <p:clrMapOvr>
+    <a:masterClrMapping/>
+  </p:clrMapOvr>
+</p:sld>
+</file>
+
+<file path=ppt/slides/slide9.xml><?xml version="1.0" encoding="utf-8"?>
 <p:sld xmlns:a="http://schemas.openxmlformats.org/drawingml/2006/main" xmlns:r="http://schemas.openxmlformats.org/officeDocument/2006/relationships" xmlns:p="http://schemas.openxmlformats.org/presentationml/2006/main">
   <p:cSld>
     <p:spTree>
@@ -7761,7 +8208,7 @@
             <a:fld id="{A49DFD55-3C28-40EF-9E31-A92D2E4017FF}" type="slidenum">
               <a:rPr lang="en-US" smtClean="0"/>
               <a:pPr/>
-              <a:t>7</a:t>
+              <a:t>9</a:t>
             </a:fld>
             <a:endParaRPr lang="en-US" dirty="0"/>
           </a:p>
@@ -8572,35 +9019,6 @@
 </file>
 
 <file path=customXml/item1.xml><?xml version="1.0" encoding="utf-8"?>
-<p:properties xmlns:p="http://schemas.microsoft.com/office/2006/metadata/properties" xmlns:xsi="http://www.w3.org/2001/XMLSchema-instance" xmlns:pc="http://schemas.microsoft.com/office/infopath/2007/PartnerControls">
-  <documentManagement>
-    <_ip_UnifiedCompliancePolicyUIAction xmlns="http://schemas.microsoft.com/sharepoint/v3" xsi:nil="true"/>
-    <Image xmlns="71af3243-3dd4-4a8d-8c0d-dd76da1f02a5">
-      <Url xsi:nil="true"/>
-      <Description xsi:nil="true"/>
-    </Image>
-    <Status xmlns="71af3243-3dd4-4a8d-8c0d-dd76da1f02a5">Not started</Status>
-    <Background xmlns="71af3243-3dd4-4a8d-8c0d-dd76da1f02a5">false</Background>
-    <_ip_UnifiedCompliancePolicyProperties xmlns="http://schemas.microsoft.com/sharepoint/v3" xsi:nil="true"/>
-    <ImageTagsTaxHTField xmlns="71af3243-3dd4-4a8d-8c0d-dd76da1f02a5">
-      <Terms xmlns="http://schemas.microsoft.com/office/infopath/2007/PartnerControls"/>
-    </ImageTagsTaxHTField>
-    <TaxCatchAll xmlns="230e9df3-be65-4c73-a93b-d1236ebd677e" xsi:nil="true"/>
-    <MediaServiceKeyPoints xmlns="71af3243-3dd4-4a8d-8c0d-dd76da1f02a5" xsi:nil="true"/>
-  </documentManagement>
-</p:properties>
-</file>
-
-<file path=customXml/item2.xml><?xml version="1.0" encoding="utf-8"?>
-<?mso-contentType ?>
-<FormTemplates xmlns="http://schemas.microsoft.com/sharepoint/v3/contenttype/forms">
-  <Display>DocumentLibraryForm</Display>
-  <Edit>DocumentLibraryForm</Edit>
-  <New>DocumentLibraryForm</New>
-</FormTemplates>
-</file>
-
-<file path=customXml/item3.xml><?xml version="1.0" encoding="utf-8"?>
 <ct:contentTypeSchema xmlns:ct="http://schemas.microsoft.com/office/2006/metadata/contentType" xmlns:ma="http://schemas.microsoft.com/office/2006/metadata/properties/metaAttributes" ct:_="" ma:_="" ma:contentTypeName="Document" ma:contentTypeID="0x01010079F111ED35F8CC479449609E8A0923A6" ma:contentTypeVersion="28" ma:contentTypeDescription="Create a new document." ma:contentTypeScope="" ma:versionID="60f5a4f2d2b0abadcf532d48ebf9cb71">
   <xsd:schema xmlns:xsd="http://www.w3.org/2001/XMLSchema" xmlns:xs="http://www.w3.org/2001/XMLSchema" xmlns:p="http://schemas.microsoft.com/office/2006/metadata/properties" xmlns:ns1="http://schemas.microsoft.com/sharepoint/v3" xmlns:ns2="71af3243-3dd4-4a8d-8c0d-dd76da1f02a5" xmlns:ns3="16c05727-aa75-4e4a-9b5f-8a80a1165891" xmlns:ns4="230e9df3-be65-4c73-a93b-d1236ebd677e" targetNamespace="http://schemas.microsoft.com/office/2006/metadata/properties" ma:root="true" ma:fieldsID="7dd78129e6a1811f84807ad11c651531" ns1:_="" ns2:_="" ns3:_="" ns4:_="">
     <xsd:import namespace="http://schemas.microsoft.com/sharepoint/v3"/>
@@ -8912,27 +9330,36 @@
 </ct:contentTypeSchema>
 </file>
 
-<file path=customXml/itemProps1.xml><?xml version="1.0" encoding="utf-8"?>
-<ds:datastoreItem xmlns:ds="http://schemas.openxmlformats.org/officeDocument/2006/customXml" ds:itemID="{49168DCE-134F-4610-A6AA-88CEBE8D71D2}">
-  <ds:schemaRefs>
-    <ds:schemaRef ds:uri="http://schemas.microsoft.com/office/2006/metadata/properties"/>
-    <ds:schemaRef ds:uri="http://schemas.microsoft.com/office/infopath/2007/PartnerControls"/>
-    <ds:schemaRef ds:uri="http://schemas.microsoft.com/sharepoint/v3"/>
-    <ds:schemaRef ds:uri="71af3243-3dd4-4a8d-8c0d-dd76da1f02a5"/>
-    <ds:schemaRef ds:uri="230e9df3-be65-4c73-a93b-d1236ebd677e"/>
-  </ds:schemaRefs>
-</ds:datastoreItem>
+<file path=customXml/item2.xml><?xml version="1.0" encoding="utf-8"?>
+<?mso-contentType ?>
+<FormTemplates xmlns="http://schemas.microsoft.com/sharepoint/v3/contenttype/forms">
+  <Display>DocumentLibraryForm</Display>
+  <Edit>DocumentLibraryForm</Edit>
+  <New>DocumentLibraryForm</New>
+</FormTemplates>
 </file>
 
-<file path=customXml/itemProps2.xml><?xml version="1.0" encoding="utf-8"?>
-<ds:datastoreItem xmlns:ds="http://schemas.openxmlformats.org/officeDocument/2006/customXml" ds:itemID="{CABF691C-888B-4061-8A6F-D5CE84A0254B}">
-  <ds:schemaRefs>
-    <ds:schemaRef ds:uri="http://schemas.microsoft.com/sharepoint/v3/contenttype/forms"/>
-  </ds:schemaRefs>
-</ds:datastoreItem>
+<file path=customXml/item3.xml><?xml version="1.0" encoding="utf-8"?>
+<p:properties xmlns:p="http://schemas.microsoft.com/office/2006/metadata/properties" xmlns:xsi="http://www.w3.org/2001/XMLSchema-instance" xmlns:pc="http://schemas.microsoft.com/office/infopath/2007/PartnerControls">
+  <documentManagement>
+    <_ip_UnifiedCompliancePolicyUIAction xmlns="http://schemas.microsoft.com/sharepoint/v3" xsi:nil="true"/>
+    <Image xmlns="71af3243-3dd4-4a8d-8c0d-dd76da1f02a5">
+      <Url xsi:nil="true"/>
+      <Description xsi:nil="true"/>
+    </Image>
+    <Status xmlns="71af3243-3dd4-4a8d-8c0d-dd76da1f02a5">Not started</Status>
+    <Background xmlns="71af3243-3dd4-4a8d-8c0d-dd76da1f02a5">false</Background>
+    <_ip_UnifiedCompliancePolicyProperties xmlns="http://schemas.microsoft.com/sharepoint/v3" xsi:nil="true"/>
+    <ImageTagsTaxHTField xmlns="71af3243-3dd4-4a8d-8c0d-dd76da1f02a5">
+      <Terms xmlns="http://schemas.microsoft.com/office/infopath/2007/PartnerControls"/>
+    </ImageTagsTaxHTField>
+    <TaxCatchAll xmlns="230e9df3-be65-4c73-a93b-d1236ebd677e" xsi:nil="true"/>
+    <MediaServiceKeyPoints xmlns="71af3243-3dd4-4a8d-8c0d-dd76da1f02a5" xsi:nil="true"/>
+  </documentManagement>
+</p:properties>
 </file>
 
-<file path=customXml/itemProps3.xml><?xml version="1.0" encoding="utf-8"?>
+<file path=customXml/itemProps1.xml><?xml version="1.0" encoding="utf-8"?>
 <ds:datastoreItem xmlns:ds="http://schemas.openxmlformats.org/officeDocument/2006/customXml" ds:itemID="{5EDE3176-A15D-46A3-BDDB-64A0D7363224}">
   <ds:schemaRefs>
     <ds:schemaRef ds:uri="http://schemas.microsoft.com/office/2006/metadata/contentType"/>
@@ -8953,6 +9380,26 @@
 </ds:datastoreItem>
 </file>
 
+<file path=customXml/itemProps2.xml><?xml version="1.0" encoding="utf-8"?>
+<ds:datastoreItem xmlns:ds="http://schemas.openxmlformats.org/officeDocument/2006/customXml" ds:itemID="{CABF691C-888B-4061-8A6F-D5CE84A0254B}">
+  <ds:schemaRefs>
+    <ds:schemaRef ds:uri="http://schemas.microsoft.com/sharepoint/v3/contenttype/forms"/>
+  </ds:schemaRefs>
+</ds:datastoreItem>
+</file>
+
+<file path=customXml/itemProps3.xml><?xml version="1.0" encoding="utf-8"?>
+<ds:datastoreItem xmlns:ds="http://schemas.openxmlformats.org/officeDocument/2006/customXml" ds:itemID="{49168DCE-134F-4610-A6AA-88CEBE8D71D2}">
+  <ds:schemaRefs>
+    <ds:schemaRef ds:uri="http://schemas.microsoft.com/office/2006/metadata/properties"/>
+    <ds:schemaRef ds:uri="http://schemas.microsoft.com/office/infopath/2007/PartnerControls"/>
+    <ds:schemaRef ds:uri="http://schemas.microsoft.com/sharepoint/v3"/>
+    <ds:schemaRef ds:uri="71af3243-3dd4-4a8d-8c0d-dd76da1f02a5"/>
+    <ds:schemaRef ds:uri="230e9df3-be65-4c73-a93b-d1236ebd677e"/>
+  </ds:schemaRefs>
+</ds:datastoreItem>
+</file>
+
 <file path=docMetadata/LabelInfo.xml><?xml version="1.0" encoding="utf-8"?>
 <clbl:labelList xmlns:clbl="http://schemas.microsoft.com/office/2020/mipLabelMetadata"/>
 </file>
</xml_diff>